<commit_message>
Cleaned up Viz overview slides. Modified Byte 3 slides.
</commit_message>
<xml_diff>
--- a/Lectures/Byte 3 Mobile.pptx
+++ b/Lectures/Byte 3 Mobile.pptx
@@ -235,7 +235,7 @@
           <a:p>
             <a:fld id="{D3AAB66F-B1B7-D045-B4E8-4F60236F228D}" type="datetimeFigureOut">
               <a:rPr lang="en-US" smtClean="0"/>
-              <a:t>1/23/17</a:t>
+              <a:t>2/8/17</a:t>
             </a:fld>
             <a:endParaRPr lang="en-US"/>
           </a:p>
@@ -401,7 +401,7 @@
           <a:p>
             <a:fld id="{BCCF8E76-06A6-164E-A6FA-EC32C13EB232}" type="datetimeFigureOut">
               <a:rPr lang="en-US" smtClean="0"/>
-              <a:t>1/23/17</a:t>
+              <a:t>2/8/17</a:t>
             </a:fld>
             <a:endParaRPr lang="en-US"/>
           </a:p>
@@ -720,7 +720,6 @@
               <a:rPr lang="en-US" dirty="0" smtClean="0"/>
               <a:t>Install appropriate version using links provided in the assignment.</a:t>
             </a:r>
-            <a:endParaRPr lang="en-US" dirty="0" smtClean="0"/>
           </a:p>
         </p:txBody>
       </p:sp>
@@ -1278,7 +1277,7 @@
             <a:fld id="{FA3C144B-2939-9A49-B014-915EC3E81866}" type="datetime1">
               <a:rPr lang="en-US" smtClean="0"/>
               <a:pPr/>
-              <a:t>1/23/17</a:t>
+              <a:t>2/8/17</a:t>
             </a:fld>
             <a:endParaRPr lang="en-US" dirty="0"/>
           </a:p>
@@ -1707,7 +1706,7 @@
           <a:p>
             <a:fld id="{76838339-A875-5E45-AB3F-AAABD270346A}" type="datetime1">
               <a:rPr lang="en-US" smtClean="0"/>
-              <a:t>1/23/17</a:t>
+              <a:t>2/8/17</a:t>
             </a:fld>
             <a:endParaRPr lang="en-US"/>
           </a:p>
@@ -1993,7 +1992,7 @@
             <a:fld id="{FA3C144B-2939-9A49-B014-915EC3E81866}" type="datetime1">
               <a:rPr lang="en-US" smtClean="0"/>
               <a:pPr/>
-              <a:t>1/23/17</a:t>
+              <a:t>2/8/17</a:t>
             </a:fld>
             <a:endParaRPr lang="en-US" dirty="0"/>
           </a:p>
@@ -2475,7 +2474,7 @@
           <a:p>
             <a:fld id="{A73F672F-A5FB-5745-934A-1BF51CA5539C}" type="datetime1">
               <a:rPr lang="en-US" smtClean="0"/>
-              <a:t>1/23/17</a:t>
+              <a:t>2/8/17</a:t>
             </a:fld>
             <a:endParaRPr lang="en-US"/>
           </a:p>
@@ -2817,7 +2816,7 @@
             <a:fld id="{FA3C144B-2939-9A49-B014-915EC3E81866}" type="datetime1">
               <a:rPr lang="en-US" smtClean="0"/>
               <a:pPr/>
-              <a:t>1/23/17</a:t>
+              <a:t>2/8/17</a:t>
             </a:fld>
             <a:endParaRPr lang="en-US" dirty="0"/>
           </a:p>
@@ -3281,7 +3280,7 @@
           <a:p>
             <a:fld id="{6AFE6A63-5EBE-3E48-B0AE-DF655A1ECE76}" type="datetime1">
               <a:rPr lang="en-US" smtClean="0"/>
-              <a:t>1/23/17</a:t>
+              <a:t>2/8/17</a:t>
             </a:fld>
             <a:endParaRPr lang="en-US"/>
           </a:p>
@@ -3600,7 +3599,7 @@
           <a:p>
             <a:fld id="{4A019F0C-9D18-B54A-9AC9-18AA74EDB034}" type="datetime1">
               <a:rPr lang="en-US" smtClean="0"/>
-              <a:t>1/23/17</a:t>
+              <a:t>2/8/17</a:t>
             </a:fld>
             <a:endParaRPr lang="en-US"/>
           </a:p>
@@ -3910,7 +3909,7 @@
             <a:fld id="{FA3C144B-2939-9A49-B014-915EC3E81866}" type="datetime1">
               <a:rPr lang="en-US" smtClean="0"/>
               <a:pPr/>
-              <a:t>1/23/17</a:t>
+              <a:t>2/8/17</a:t>
             </a:fld>
             <a:endParaRPr lang="en-US" dirty="0"/>
           </a:p>
@@ -4173,7 +4172,7 @@
           <a:p>
             <a:fld id="{FA3C144B-2939-9A49-B014-915EC3E81866}" type="datetime1">
               <a:rPr lang="en-US" smtClean="0"/>
-              <a:t>1/23/17</a:t>
+              <a:t>2/8/17</a:t>
             </a:fld>
             <a:endParaRPr lang="en-US" dirty="0"/>
           </a:p>
@@ -4820,7 +4819,7 @@
           <a:p>
             <a:fld id="{7053BEFA-1175-F644-B249-7D41D72BD3FF}" type="datetime1">
               <a:rPr lang="en-US" smtClean="0"/>
-              <a:t>1/23/17</a:t>
+              <a:t>2/8/17</a:t>
             </a:fld>
             <a:endParaRPr lang="en-US"/>
           </a:p>
@@ -4939,7 +4938,7 @@
             <a:fld id="{FA3C144B-2939-9A49-B014-915EC3E81866}" type="datetime1">
               <a:rPr lang="en-US" smtClean="0"/>
               <a:pPr/>
-              <a:t>1/23/17</a:t>
+              <a:t>2/8/17</a:t>
             </a:fld>
             <a:endParaRPr lang="en-US" dirty="0"/>
           </a:p>
@@ -5156,7 +5155,7 @@
             <a:fld id="{FA3C144B-2939-9A49-B014-915EC3E81866}" type="datetime1">
               <a:rPr lang="en-US" smtClean="0"/>
               <a:pPr/>
-              <a:t>1/23/17</a:t>
+              <a:t>2/8/17</a:t>
             </a:fld>
             <a:endParaRPr lang="en-US" dirty="0"/>
           </a:p>
@@ -5401,7 +5400,7 @@
             <a:fld id="{FA3C144B-2939-9A49-B014-915EC3E81866}" type="datetime1">
               <a:rPr lang="en-US" smtClean="0"/>
               <a:pPr/>
-              <a:t>1/23/17</a:t>
+              <a:t>2/8/17</a:t>
             </a:fld>
             <a:endParaRPr lang="en-US" dirty="0"/>
           </a:p>
@@ -5779,7 +5778,7 @@
           <a:p>
             <a:fld id="{111EEF3B-ABF2-AA4E-9E24-0C6256942674}" type="datetime1">
               <a:rPr lang="en-US" smtClean="0"/>
-              <a:t>1/23/17</a:t>
+              <a:t>2/8/17</a:t>
             </a:fld>
             <a:endParaRPr lang="en-US"/>
           </a:p>
@@ -5943,7 +5942,7 @@
             <a:fld id="{FA3C144B-2939-9A49-B014-915EC3E81866}" type="datetime1">
               <a:rPr lang="en-US" smtClean="0"/>
               <a:pPr/>
-              <a:t>1/23/17</a:t>
+              <a:t>2/8/17</a:t>
             </a:fld>
             <a:endParaRPr lang="en-US" dirty="0"/>
           </a:p>
@@ -6360,7 +6359,7 @@
             <a:fld id="{FA3C144B-2939-9A49-B014-915EC3E81866}" type="datetime1">
               <a:rPr lang="en-US" smtClean="0"/>
               <a:pPr/>
-              <a:t>1/23/17</a:t>
+              <a:t>2/8/17</a:t>
             </a:fld>
             <a:endParaRPr lang="en-US" dirty="0"/>
           </a:p>
@@ -6676,7 +6675,7 @@
             <a:fld id="{FA3C144B-2939-9A49-B014-915EC3E81866}" type="datetime1">
               <a:rPr lang="en-US" smtClean="0"/>
               <a:pPr/>
-              <a:t>1/23/17</a:t>
+              <a:t>2/8/17</a:t>
             </a:fld>
             <a:endParaRPr lang="en-US" dirty="0"/>
           </a:p>
@@ -7342,7 +7341,7 @@
             <a:fld id="{FA3C144B-2939-9A49-B014-915EC3E81866}" type="datetime1">
               <a:rPr lang="en-US" smtClean="0"/>
               <a:pPr/>
-              <a:t>1/23/17</a:t>
+              <a:t>2/8/17</a:t>
             </a:fld>
             <a:endParaRPr lang="en-US" dirty="0"/>
           </a:p>
@@ -7627,7 +7626,7 @@
           <a:effectLst/>
           <a:extLst>
             <a:ext uri="{91240B29-F687-4f45-9708-019B960494DF}">
-              <a14:hiddenLine xmlns:a14="http://schemas.microsoft.com/office/drawing/2010/main" xmlns="" w="9525">
+              <a14:hiddenLine xmlns="" xmlns:a14="http://schemas.microsoft.com/office/drawing/2010/main" w="9525">
                 <a:solidFill>
                   <a:srgbClr val="000000"/>
                 </a:solidFill>
@@ -7637,7 +7636,7 @@
               </a14:hiddenLine>
             </a:ext>
             <a:ext uri="{AF507438-7753-43e0-B8FC-AC1667EBCBE1}">
-              <a14:hiddenEffects xmlns:a14="http://schemas.microsoft.com/office/drawing/2010/main" xmlns="">
+              <a14:hiddenEffects xmlns="" xmlns:a14="http://schemas.microsoft.com/office/drawing/2010/main">
                 <a:effectLst>
                   <a:outerShdw blurRad="40000" dist="23000" dir="5400000" rotWithShape="0">
                     <a:srgbClr val="000000">
@@ -8136,11 +8135,7 @@
           <a:p>
             <a:r>
               <a:rPr lang="en-US" dirty="0" smtClean="0"/>
-              <a:t>The Data Pipeline; HCII; Spring </a:t>
-            </a:r>
-            <a:r>
-              <a:rPr lang="en-US" dirty="0" smtClean="0"/>
-              <a:t>2017</a:t>
+              <a:t>The Data Pipeline; HCII; Spring 2017</a:t>
             </a:r>
             <a:endParaRPr lang="en-US" dirty="0"/>
           </a:p>
@@ -8352,7 +8347,7 @@
           <a:effectLst/>
           <a:extLst>
             <a:ext uri="{91240B29-F687-4f45-9708-019B960494DF}">
-              <a14:hiddenLine xmlns:a14="http://schemas.microsoft.com/office/drawing/2010/main" xmlns="" w="9525">
+              <a14:hiddenLine xmlns="" xmlns:a14="http://schemas.microsoft.com/office/drawing/2010/main" w="9525">
                 <a:solidFill>
                   <a:srgbClr val="000000"/>
                 </a:solidFill>
@@ -8362,7 +8357,7 @@
               </a14:hiddenLine>
             </a:ext>
             <a:ext uri="{AF507438-7753-43e0-B8FC-AC1667EBCBE1}">
-              <a14:hiddenEffects xmlns:a14="http://schemas.microsoft.com/office/drawing/2010/main" xmlns="">
+              <a14:hiddenEffects xmlns="" xmlns:a14="http://schemas.microsoft.com/office/drawing/2010/main">
                 <a:effectLst>
                   <a:outerShdw blurRad="40000" dist="23000" dir="5400000" rotWithShape="0">
                     <a:srgbClr val="000000">
@@ -8450,7 +8445,6 @@
               <a:rPr lang="en-US" dirty="0"/>
               <a:t> (optional)</a:t>
             </a:r>
-            <a:endParaRPr lang="en-US" dirty="0"/>
           </a:p>
         </p:txBody>
       </p:sp>
@@ -8547,7 +8541,7 @@
           <a:p>
             <a:fld id="{7053BEFA-1175-F644-B249-7D41D72BD3FF}" type="datetime1">
               <a:rPr lang="en-US" smtClean="0"/>
-              <a:t>1/23/17</a:t>
+              <a:t>2/8/17</a:t>
             </a:fld>
             <a:endParaRPr lang="en-US"/>
           </a:p>
@@ -8783,7 +8777,6 @@
               <a:rPr lang="en-US" dirty="0"/>
               <a:t> (optional)</a:t>
             </a:r>
-            <a:endParaRPr lang="en-US" dirty="0"/>
           </a:p>
         </p:txBody>
       </p:sp>
@@ -8880,7 +8873,7 @@
           <a:p>
             <a:fld id="{7053BEFA-1175-F644-B249-7D41D72BD3FF}" type="datetime1">
               <a:rPr lang="en-US" smtClean="0"/>
-              <a:t>1/23/17</a:t>
+              <a:t>2/8/17</a:t>
             </a:fld>
             <a:endParaRPr lang="en-US"/>
           </a:p>
@@ -9387,7 +9380,7 @@
           <a:p>
             <a:fld id="{7053BEFA-1175-F644-B249-7D41D72BD3FF}" type="datetime1">
               <a:rPr lang="en-US" smtClean="0"/>
-              <a:t>1/23/17</a:t>
+              <a:t>2/8/17</a:t>
             </a:fld>
             <a:endParaRPr lang="en-US"/>
           </a:p>
@@ -9531,7 +9524,7 @@
           <a:p>
             <a:fld id="{7053BEFA-1175-F644-B249-7D41D72BD3FF}" type="datetime1">
               <a:rPr lang="en-US" smtClean="0"/>
-              <a:t>1/23/17</a:t>
+              <a:t>2/8/17</a:t>
             </a:fld>
             <a:endParaRPr lang="en-US"/>
           </a:p>
@@ -9656,7 +9649,7 @@
           <a:p>
             <a:fld id="{7053BEFA-1175-F644-B249-7D41D72BD3FF}" type="datetime1">
               <a:rPr lang="en-US" smtClean="0"/>
-              <a:t>1/23/17</a:t>
+              <a:t>2/8/17</a:t>
             </a:fld>
             <a:endParaRPr lang="en-US"/>
           </a:p>
@@ -9808,7 +9801,7 @@
           <a:p>
             <a:fld id="{7053BEFA-1175-F644-B249-7D41D72BD3FF}" type="datetime1">
               <a:rPr lang="en-US" smtClean="0"/>
-              <a:t>1/23/17</a:t>
+              <a:t>2/8/17</a:t>
             </a:fld>
             <a:endParaRPr lang="en-US"/>
           </a:p>
@@ -9952,7 +9945,7 @@
           <a:p>
             <a:fld id="{7053BEFA-1175-F644-B249-7D41D72BD3FF}" type="datetime1">
               <a:rPr lang="en-US" smtClean="0"/>
-              <a:t>1/23/17</a:t>
+              <a:t>2/8/17</a:t>
             </a:fld>
             <a:endParaRPr lang="en-US"/>
           </a:p>
@@ -10101,7 +10094,7 @@
           <a:p>
             <a:fld id="{7053BEFA-1175-F644-B249-7D41D72BD3FF}" type="datetime1">
               <a:rPr lang="en-US" smtClean="0"/>
-              <a:t>1/23/17</a:t>
+              <a:t>2/8/17</a:t>
             </a:fld>
             <a:endParaRPr lang="en-US"/>
           </a:p>
@@ -10245,7 +10238,7 @@
           <a:p>
             <a:fld id="{7053BEFA-1175-F644-B249-7D41D72BD3FF}" type="datetime1">
               <a:rPr lang="en-US" smtClean="0"/>
-              <a:t>1/23/17</a:t>
+              <a:t>2/8/17</a:t>
             </a:fld>
             <a:endParaRPr lang="en-US"/>
           </a:p>
@@ -10389,7 +10382,7 @@
           <a:p>
             <a:fld id="{7053BEFA-1175-F644-B249-7D41D72BD3FF}" type="datetime1">
               <a:rPr lang="en-US" smtClean="0"/>
-              <a:t>1/23/17</a:t>
+              <a:t>2/8/17</a:t>
             </a:fld>
             <a:endParaRPr lang="en-US"/>
           </a:p>
@@ -10591,7 +10584,7 @@
           <a:p>
             <a:fld id="{7053BEFA-1175-F644-B249-7D41D72BD3FF}" type="datetime1">
               <a:rPr lang="en-US" smtClean="0"/>
-              <a:t>1/23/17</a:t>
+              <a:t>2/8/17</a:t>
             </a:fld>
             <a:endParaRPr lang="en-US" dirty="0"/>
           </a:p>
@@ -10759,8 +10752,21 @@
             </a:r>
             <a:r>
               <a:rPr lang="en-US" dirty="0"/>
-              <a:t>=_DB, user='root')</a:t>
-            </a:r>
+              <a:t>=_DB, user=</a:t>
+            </a:r>
+            <a:r>
+              <a:rPr lang="en-US" dirty="0" smtClean="0"/>
+              <a:t>'root’, </a:t>
+            </a:r>
+            <a:r>
+              <a:rPr lang="en-US" dirty="0" err="1" smtClean="0"/>
+              <a:t>passwd</a:t>
+            </a:r>
+            <a:r>
+              <a:rPr lang="en-US" dirty="0" smtClean="0"/>
+              <a:t>=‘password’)</a:t>
+            </a:r>
+            <a:endParaRPr lang="en-US" dirty="0"/>
           </a:p>
           <a:p>
             <a:pPr marL="0" indent="0">
@@ -10863,7 +10869,7 @@
           <a:p>
             <a:fld id="{7053BEFA-1175-F644-B249-7D41D72BD3FF}" type="datetime1">
               <a:rPr lang="en-US" smtClean="0"/>
-              <a:t>1/23/17</a:t>
+              <a:t>2/8/17</a:t>
             </a:fld>
             <a:endParaRPr lang="en-US"/>
           </a:p>
@@ -11020,7 +11026,7 @@
           <a:p>
             <a:fld id="{7053BEFA-1175-F644-B249-7D41D72BD3FF}" type="datetime1">
               <a:rPr lang="en-US" smtClean="0"/>
-              <a:t>1/23/17</a:t>
+              <a:t>2/8/17</a:t>
             </a:fld>
             <a:endParaRPr lang="en-US"/>
           </a:p>
@@ -11068,30 +11074,6 @@
           </a:p>
         </p:txBody>
       </p:sp>
-      <p:pic>
-        <p:nvPicPr>
-          <p:cNvPr id="7" name="Picture 6"/>
-          <p:cNvPicPr>
-            <a:picLocks noChangeAspect="1"/>
-          </p:cNvPicPr>
-          <p:nvPr/>
-        </p:nvPicPr>
-        <p:blipFill>
-          <a:blip r:embed="rId2"/>
-          <a:stretch>
-            <a:fillRect/>
-          </a:stretch>
-        </p:blipFill>
-        <p:spPr>
-          <a:xfrm>
-            <a:off x="0" y="3460837"/>
-            <a:ext cx="9144000" cy="3127761"/>
-          </a:xfrm>
-          <a:prstGeom prst="rect">
-            <a:avLst/>
-          </a:prstGeom>
-        </p:spPr>
-      </p:pic>
     </p:spTree>
     <p:extLst>
       <p:ext uri="{BB962C8B-B14F-4D97-AF65-F5344CB8AC3E}">
@@ -11183,7 +11165,15 @@
             </a:r>
             <a:r>
               <a:rPr lang="en-US" dirty="0" smtClean="0"/>
-              <a:t>]-byte4 browser window</a:t>
+              <a:t>]-</a:t>
+            </a:r>
+            <a:r>
+              <a:rPr lang="en-US" dirty="0" smtClean="0"/>
+              <a:t>byte3 </a:t>
+            </a:r>
+            <a:r>
+              <a:rPr lang="en-US" dirty="0" smtClean="0"/>
+              <a:t>browser window</a:t>
             </a:r>
             <a:endParaRPr lang="en-US" dirty="0"/>
           </a:p>
@@ -11206,7 +11196,7 @@
           <a:p>
             <a:fld id="{7053BEFA-1175-F644-B249-7D41D72BD3FF}" type="datetime1">
               <a:rPr lang="en-US" smtClean="0"/>
-              <a:t>1/23/17</a:t>
+              <a:t>2/8/17</a:t>
             </a:fld>
             <a:endParaRPr lang="en-US"/>
           </a:p>
@@ -11331,8 +11321,19 @@
           <a:p>
             <a:r>
               <a:rPr lang="en-US" dirty="0" smtClean="0"/>
-              <a:t>Cleaning: can you tell when the phone is off? (not a focus of this byte)</a:t>
-            </a:r>
+              <a:t>Cleaning: can you tell when the phone is off</a:t>
+            </a:r>
+            <a:r>
+              <a:rPr lang="en-US" dirty="0" smtClean="0"/>
+              <a:t>?</a:t>
+            </a:r>
+          </a:p>
+          <a:p>
+            <a:r>
+              <a:rPr lang="en-US" dirty="0" smtClean="0"/>
+              <a:t>Imputing: filling in missing location readings.</a:t>
+            </a:r>
+            <a:endParaRPr lang="en-US" dirty="0" smtClean="0"/>
           </a:p>
           <a:p>
             <a:r>
@@ -11368,7 +11369,7 @@
           <a:p>
             <a:fld id="{7053BEFA-1175-F644-B249-7D41D72BD3FF}" type="datetime1">
               <a:rPr lang="en-US" smtClean="0"/>
-              <a:t>1/23/17</a:t>
+              <a:t>2/8/17</a:t>
             </a:fld>
             <a:endParaRPr lang="en-US"/>
           </a:p>
@@ -11499,24 +11500,31 @@
           <a:p>
             <a:r>
               <a:rPr lang="en-US" dirty="0" smtClean="0"/>
-              <a:t>Explore relationship </a:t>
-            </a:r>
-            <a:r>
-              <a:rPr lang="en-US" dirty="0"/>
-              <a:t>between time and </a:t>
-            </a:r>
-            <a:r>
-              <a:rPr lang="en-US" dirty="0" smtClean="0"/>
-              <a:t>activity (your main job on this assignment)</a:t>
-            </a:r>
-            <a:endParaRPr lang="en-US" dirty="0"/>
-          </a:p>
-          <a:p>
-            <a:r>
-              <a:rPr lang="en-US" dirty="0" smtClean="0"/>
-              <a:t>Display the results (more nicely than I do!)</a:t>
-            </a:r>
-            <a:endParaRPr lang="en-US" dirty="0"/>
+              <a:t>Tell a story about your data.</a:t>
+            </a:r>
+            <a:endParaRPr lang="en-US" dirty="0"/>
+          </a:p>
+          <a:p>
+            <a:r>
+              <a:rPr lang="en-US" smtClean="0"/>
+              <a:t>Visualize </a:t>
+            </a:r>
+            <a:r>
+              <a:rPr lang="en-US" dirty="0" smtClean="0"/>
+              <a:t>the results (more nicely than </a:t>
+            </a:r>
+            <a:r>
+              <a:rPr lang="en-US" dirty="0" smtClean="0"/>
+              <a:t>we </a:t>
+            </a:r>
+            <a:r>
+              <a:rPr lang="en-US" smtClean="0"/>
+              <a:t>do</a:t>
+            </a:r>
+            <a:r>
+              <a:rPr lang="en-US" smtClean="0"/>
+              <a:t>!)</a:t>
+            </a:r>
           </a:p>
         </p:txBody>
       </p:sp>
@@ -11537,7 +11545,7 @@
           <a:p>
             <a:fld id="{7053BEFA-1175-F644-B249-7D41D72BD3FF}" type="datetime1">
               <a:rPr lang="en-US" smtClean="0"/>
-              <a:t>1/23/17</a:t>
+              <a:t>2/8/17</a:t>
             </a:fld>
             <a:endParaRPr lang="en-US"/>
           </a:p>
@@ -11661,18 +11669,18 @@
           <a:lstStyle/>
           <a:p>
             <a:r>
-              <a:rPr lang="en-US" dirty="0" smtClean="0"/>
-              <a:t>You could design a study that looks at something besides activity</a:t>
-            </a:r>
-          </a:p>
-          <a:p>
-            <a:r>
-              <a:rPr lang="en-US" dirty="0" smtClean="0"/>
-              <a:t>Talk to me about goals &amp; outcomes that </a:t>
-            </a:r>
-            <a:r>
-              <a:rPr lang="en-US" smtClean="0"/>
-              <a:t>make sense</a:t>
+              <a:rPr lang="en-US" dirty="0"/>
+              <a:t>Make it interactive!</a:t>
+            </a:r>
+          </a:p>
+          <a:p>
+            <a:r>
+              <a:rPr lang="en-US" dirty="0" smtClean="0"/>
+              <a:t>Talk </a:t>
+            </a:r>
+            <a:r>
+              <a:rPr lang="en-US" dirty="0" smtClean="0"/>
+              <a:t>to me about goals &amp; outcomes that make sense</a:t>
             </a:r>
             <a:endParaRPr lang="en-US" dirty="0"/>
           </a:p>
@@ -11695,7 +11703,7 @@
           <a:p>
             <a:fld id="{7053BEFA-1175-F644-B249-7D41D72BD3FF}" type="datetime1">
               <a:rPr lang="en-US" smtClean="0"/>
-              <a:t>1/23/17</a:t>
+              <a:t>2/9/17</a:t>
             </a:fld>
             <a:endParaRPr lang="en-US"/>
           </a:p>
@@ -11825,7 +11833,7 @@
           <a:p>
             <a:fld id="{7053BEFA-1175-F644-B249-7D41D72BD3FF}" type="datetime1">
               <a:rPr lang="en-US" smtClean="0"/>
-              <a:t>1/23/17</a:t>
+              <a:t>2/8/17</a:t>
             </a:fld>
             <a:endParaRPr lang="en-US"/>
           </a:p>
@@ -12025,7 +12033,7 @@
           <a:p>
             <a:fld id="{7053BEFA-1175-F644-B249-7D41D72BD3FF}" type="datetime1">
               <a:rPr lang="en-US" smtClean="0"/>
-              <a:t>1/23/17</a:t>
+              <a:t>2/8/17</a:t>
             </a:fld>
             <a:endParaRPr lang="en-US"/>
           </a:p>
@@ -12209,7 +12217,7 @@
           <a:p>
             <a:fld id="{7053BEFA-1175-F644-B249-7D41D72BD3FF}" type="datetime1">
               <a:rPr lang="en-US" smtClean="0"/>
-              <a:t>1/23/17</a:t>
+              <a:t>2/8/17</a:t>
             </a:fld>
             <a:endParaRPr lang="en-US" dirty="0"/>
           </a:p>
@@ -12347,15 +12355,7 @@
           <a:p>
             <a:r>
               <a:rPr lang="en-US" dirty="0" smtClean="0"/>
-              <a:t>Byte </a:t>
-            </a:r>
-            <a:r>
-              <a:rPr lang="en-US" dirty="0" smtClean="0"/>
-              <a:t>3 Part 1 </a:t>
-            </a:r>
-            <a:r>
-              <a:rPr lang="en-US" dirty="0" smtClean="0"/>
-              <a:t>(2 weeks)</a:t>
+              <a:t>Byte 3 Part 1 (2 weeks)</a:t>
             </a:r>
             <a:endParaRPr lang="en-US" dirty="0"/>
           </a:p>
@@ -12390,11 +12390,7 @@
             </a:pPr>
             <a:r>
               <a:rPr lang="en-US" b="1" dirty="0" smtClean="0"/>
-              <a:t>REQUIRED </a:t>
-            </a:r>
-            <a:r>
-              <a:rPr lang="en-US" b="1" dirty="0" smtClean="0"/>
-              <a:t>HARDWARE: </a:t>
+              <a:t>REQUIRED HARDWARE: </a:t>
             </a:r>
             <a:r>
               <a:rPr lang="en-US" b="1" i="1" dirty="0" smtClean="0"/>
@@ -12427,7 +12423,7 @@
           <a:p>
             <a:fld id="{7053BEFA-1175-F644-B249-7D41D72BD3FF}" type="datetime1">
               <a:rPr lang="en-US" smtClean="0"/>
-              <a:t>1/23/17</a:t>
+              <a:t>2/8/17</a:t>
             </a:fld>
             <a:endParaRPr lang="en-US"/>
           </a:p>
@@ -12694,7 +12690,7 @@
             <a:fld id="{7053BEFA-1175-F644-B249-7D41D72BD3FF}" type="datetime1">
               <a:rPr lang="en-US"/>
               <a:pPr/>
-              <a:t>1/23/17</a:t>
+              <a:t>2/8/17</a:t>
             </a:fld>
             <a:endParaRPr lang="en-US" dirty="0"/>
           </a:p>
@@ -13123,7 +13119,7 @@
           <a:p>
             <a:fld id="{7053BEFA-1175-F644-B249-7D41D72BD3FF}" type="datetime1">
               <a:rPr lang="en-US" smtClean="0"/>
-              <a:t>1/23/17</a:t>
+              <a:t>2/8/17</a:t>
             </a:fld>
             <a:endParaRPr lang="en-US"/>
           </a:p>
@@ -13355,7 +13351,6 @@
               <a:rPr lang="en-US" dirty="0"/>
               <a:t> (optional)</a:t>
             </a:r>
-            <a:endParaRPr lang="en-US" dirty="0"/>
           </a:p>
         </p:txBody>
       </p:sp>
@@ -13452,7 +13447,7 @@
           <a:p>
             <a:fld id="{7053BEFA-1175-F644-B249-7D41D72BD3FF}" type="datetime1">
               <a:rPr lang="en-US" smtClean="0"/>
-              <a:t>1/23/17</a:t>
+              <a:t>2/8/17</a:t>
             </a:fld>
             <a:endParaRPr lang="en-US"/>
           </a:p>
@@ -13583,11 +13578,7 @@
           <a:p>
             <a:r>
               <a:rPr lang="en-US" dirty="0" smtClean="0"/>
-              <a:t>Step 2: Give </a:t>
-            </a:r>
-            <a:r>
-              <a:rPr lang="en-US" dirty="0" smtClean="0"/>
-              <a:t>access </a:t>
+              <a:t>Step 2: Give access </a:t>
             </a:r>
             <a:br>
               <a:rPr lang="en-US" dirty="0" smtClean="0"/>

</xml_diff>

<commit_message>
final lectures for today.
</commit_message>
<xml_diff>
--- a/Lectures/Byte 3 Mobile.pptx
+++ b/Lectures/Byte 3 Mobile.pptx
@@ -235,7 +235,7 @@
           <a:p>
             <a:fld id="{D3AAB66F-B1B7-D045-B4E8-4F60236F228D}" type="datetimeFigureOut">
               <a:rPr lang="en-US" smtClean="0"/>
-              <a:t>2/8/17</a:t>
+              <a:t>2/16/17</a:t>
             </a:fld>
             <a:endParaRPr lang="en-US"/>
           </a:p>
@@ -401,7 +401,7 @@
           <a:p>
             <a:fld id="{BCCF8E76-06A6-164E-A6FA-EC32C13EB232}" type="datetimeFigureOut">
               <a:rPr lang="en-US" smtClean="0"/>
-              <a:t>2/8/17</a:t>
+              <a:t>2/16/17</a:t>
             </a:fld>
             <a:endParaRPr lang="en-US"/>
           </a:p>
@@ -1277,7 +1277,7 @@
             <a:fld id="{FA3C144B-2939-9A49-B014-915EC3E81866}" type="datetime1">
               <a:rPr lang="en-US" smtClean="0"/>
               <a:pPr/>
-              <a:t>2/8/17</a:t>
+              <a:t>2/16/17</a:t>
             </a:fld>
             <a:endParaRPr lang="en-US" dirty="0"/>
           </a:p>
@@ -1706,7 +1706,7 @@
           <a:p>
             <a:fld id="{76838339-A875-5E45-AB3F-AAABD270346A}" type="datetime1">
               <a:rPr lang="en-US" smtClean="0"/>
-              <a:t>2/8/17</a:t>
+              <a:t>2/16/17</a:t>
             </a:fld>
             <a:endParaRPr lang="en-US"/>
           </a:p>
@@ -1992,7 +1992,7 @@
             <a:fld id="{FA3C144B-2939-9A49-B014-915EC3E81866}" type="datetime1">
               <a:rPr lang="en-US" smtClean="0"/>
               <a:pPr/>
-              <a:t>2/8/17</a:t>
+              <a:t>2/16/17</a:t>
             </a:fld>
             <a:endParaRPr lang="en-US" dirty="0"/>
           </a:p>
@@ -2474,7 +2474,7 @@
           <a:p>
             <a:fld id="{A73F672F-A5FB-5745-934A-1BF51CA5539C}" type="datetime1">
               <a:rPr lang="en-US" smtClean="0"/>
-              <a:t>2/8/17</a:t>
+              <a:t>2/16/17</a:t>
             </a:fld>
             <a:endParaRPr lang="en-US"/>
           </a:p>
@@ -2816,7 +2816,7 @@
             <a:fld id="{FA3C144B-2939-9A49-B014-915EC3E81866}" type="datetime1">
               <a:rPr lang="en-US" smtClean="0"/>
               <a:pPr/>
-              <a:t>2/8/17</a:t>
+              <a:t>2/16/17</a:t>
             </a:fld>
             <a:endParaRPr lang="en-US" dirty="0"/>
           </a:p>
@@ -3280,7 +3280,7 @@
           <a:p>
             <a:fld id="{6AFE6A63-5EBE-3E48-B0AE-DF655A1ECE76}" type="datetime1">
               <a:rPr lang="en-US" smtClean="0"/>
-              <a:t>2/8/17</a:t>
+              <a:t>2/16/17</a:t>
             </a:fld>
             <a:endParaRPr lang="en-US"/>
           </a:p>
@@ -3599,7 +3599,7 @@
           <a:p>
             <a:fld id="{4A019F0C-9D18-B54A-9AC9-18AA74EDB034}" type="datetime1">
               <a:rPr lang="en-US" smtClean="0"/>
-              <a:t>2/8/17</a:t>
+              <a:t>2/16/17</a:t>
             </a:fld>
             <a:endParaRPr lang="en-US"/>
           </a:p>
@@ -3909,7 +3909,7 @@
             <a:fld id="{FA3C144B-2939-9A49-B014-915EC3E81866}" type="datetime1">
               <a:rPr lang="en-US" smtClean="0"/>
               <a:pPr/>
-              <a:t>2/8/17</a:t>
+              <a:t>2/16/17</a:t>
             </a:fld>
             <a:endParaRPr lang="en-US" dirty="0"/>
           </a:p>
@@ -4172,7 +4172,7 @@
           <a:p>
             <a:fld id="{FA3C144B-2939-9A49-B014-915EC3E81866}" type="datetime1">
               <a:rPr lang="en-US" smtClean="0"/>
-              <a:t>2/8/17</a:t>
+              <a:t>2/16/17</a:t>
             </a:fld>
             <a:endParaRPr lang="en-US" dirty="0"/>
           </a:p>
@@ -4819,7 +4819,7 @@
           <a:p>
             <a:fld id="{7053BEFA-1175-F644-B249-7D41D72BD3FF}" type="datetime1">
               <a:rPr lang="en-US" smtClean="0"/>
-              <a:t>2/8/17</a:t>
+              <a:t>2/16/17</a:t>
             </a:fld>
             <a:endParaRPr lang="en-US"/>
           </a:p>
@@ -4938,7 +4938,7 @@
             <a:fld id="{FA3C144B-2939-9A49-B014-915EC3E81866}" type="datetime1">
               <a:rPr lang="en-US" smtClean="0"/>
               <a:pPr/>
-              <a:t>2/8/17</a:t>
+              <a:t>2/16/17</a:t>
             </a:fld>
             <a:endParaRPr lang="en-US" dirty="0"/>
           </a:p>
@@ -5155,7 +5155,7 @@
             <a:fld id="{FA3C144B-2939-9A49-B014-915EC3E81866}" type="datetime1">
               <a:rPr lang="en-US" smtClean="0"/>
               <a:pPr/>
-              <a:t>2/8/17</a:t>
+              <a:t>2/16/17</a:t>
             </a:fld>
             <a:endParaRPr lang="en-US" dirty="0"/>
           </a:p>
@@ -5400,7 +5400,7 @@
             <a:fld id="{FA3C144B-2939-9A49-B014-915EC3E81866}" type="datetime1">
               <a:rPr lang="en-US" smtClean="0"/>
               <a:pPr/>
-              <a:t>2/8/17</a:t>
+              <a:t>2/16/17</a:t>
             </a:fld>
             <a:endParaRPr lang="en-US" dirty="0"/>
           </a:p>
@@ -5778,7 +5778,7 @@
           <a:p>
             <a:fld id="{111EEF3B-ABF2-AA4E-9E24-0C6256942674}" type="datetime1">
               <a:rPr lang="en-US" smtClean="0"/>
-              <a:t>2/8/17</a:t>
+              <a:t>2/16/17</a:t>
             </a:fld>
             <a:endParaRPr lang="en-US"/>
           </a:p>
@@ -5942,7 +5942,7 @@
             <a:fld id="{FA3C144B-2939-9A49-B014-915EC3E81866}" type="datetime1">
               <a:rPr lang="en-US" smtClean="0"/>
               <a:pPr/>
-              <a:t>2/8/17</a:t>
+              <a:t>2/16/17</a:t>
             </a:fld>
             <a:endParaRPr lang="en-US" dirty="0"/>
           </a:p>
@@ -6359,7 +6359,7 @@
             <a:fld id="{FA3C144B-2939-9A49-B014-915EC3E81866}" type="datetime1">
               <a:rPr lang="en-US" smtClean="0"/>
               <a:pPr/>
-              <a:t>2/8/17</a:t>
+              <a:t>2/16/17</a:t>
             </a:fld>
             <a:endParaRPr lang="en-US" dirty="0"/>
           </a:p>
@@ -6675,7 +6675,7 @@
             <a:fld id="{FA3C144B-2939-9A49-B014-915EC3E81866}" type="datetime1">
               <a:rPr lang="en-US" smtClean="0"/>
               <a:pPr/>
-              <a:t>2/8/17</a:t>
+              <a:t>2/16/17</a:t>
             </a:fld>
             <a:endParaRPr lang="en-US" dirty="0"/>
           </a:p>
@@ -7341,7 +7341,7 @@
             <a:fld id="{FA3C144B-2939-9A49-B014-915EC3E81866}" type="datetime1">
               <a:rPr lang="en-US" smtClean="0"/>
               <a:pPr/>
-              <a:t>2/8/17</a:t>
+              <a:t>2/16/17</a:t>
             </a:fld>
             <a:endParaRPr lang="en-US" dirty="0"/>
           </a:p>
@@ -7626,7 +7626,7 @@
           <a:effectLst/>
           <a:extLst>
             <a:ext uri="{91240B29-F687-4f45-9708-019B960494DF}">
-              <a14:hiddenLine xmlns="" xmlns:a14="http://schemas.microsoft.com/office/drawing/2010/main" w="9525">
+              <a14:hiddenLine xmlns:a14="http://schemas.microsoft.com/office/drawing/2010/main" xmlns="" w="9525">
                 <a:solidFill>
                   <a:srgbClr val="000000"/>
                 </a:solidFill>
@@ -7636,7 +7636,7 @@
               </a14:hiddenLine>
             </a:ext>
             <a:ext uri="{AF507438-7753-43e0-B8FC-AC1667EBCBE1}">
-              <a14:hiddenEffects xmlns="" xmlns:a14="http://schemas.microsoft.com/office/drawing/2010/main">
+              <a14:hiddenEffects xmlns:a14="http://schemas.microsoft.com/office/drawing/2010/main" xmlns="">
                 <a:effectLst>
                   <a:outerShdw blurRad="40000" dist="23000" dir="5400000" rotWithShape="0">
                     <a:srgbClr val="000000">
@@ -8347,7 +8347,7 @@
           <a:effectLst/>
           <a:extLst>
             <a:ext uri="{91240B29-F687-4f45-9708-019B960494DF}">
-              <a14:hiddenLine xmlns="" xmlns:a14="http://schemas.microsoft.com/office/drawing/2010/main" w="9525">
+              <a14:hiddenLine xmlns:a14="http://schemas.microsoft.com/office/drawing/2010/main" xmlns="" w="9525">
                 <a:solidFill>
                   <a:srgbClr val="000000"/>
                 </a:solidFill>
@@ -8357,7 +8357,7 @@
               </a14:hiddenLine>
             </a:ext>
             <a:ext uri="{AF507438-7753-43e0-B8FC-AC1667EBCBE1}">
-              <a14:hiddenEffects xmlns="" xmlns:a14="http://schemas.microsoft.com/office/drawing/2010/main">
+              <a14:hiddenEffects xmlns:a14="http://schemas.microsoft.com/office/drawing/2010/main" xmlns="">
                 <a:effectLst>
                   <a:outerShdw blurRad="40000" dist="23000" dir="5400000" rotWithShape="0">
                     <a:srgbClr val="000000">
@@ -8541,7 +8541,7 @@
           <a:p>
             <a:fld id="{7053BEFA-1175-F644-B249-7D41D72BD3FF}" type="datetime1">
               <a:rPr lang="en-US" smtClean="0"/>
-              <a:t>2/8/17</a:t>
+              <a:t>2/16/17</a:t>
             </a:fld>
             <a:endParaRPr lang="en-US"/>
           </a:p>
@@ -8873,7 +8873,7 @@
           <a:p>
             <a:fld id="{7053BEFA-1175-F644-B249-7D41D72BD3FF}" type="datetime1">
               <a:rPr lang="en-US" smtClean="0"/>
-              <a:t>2/8/17</a:t>
+              <a:t>2/16/17</a:t>
             </a:fld>
             <a:endParaRPr lang="en-US"/>
           </a:p>
@@ -9380,7 +9380,7 @@
           <a:p>
             <a:fld id="{7053BEFA-1175-F644-B249-7D41D72BD3FF}" type="datetime1">
               <a:rPr lang="en-US" smtClean="0"/>
-              <a:t>2/8/17</a:t>
+              <a:t>2/16/17</a:t>
             </a:fld>
             <a:endParaRPr lang="en-US"/>
           </a:p>
@@ -9524,7 +9524,7 @@
           <a:p>
             <a:fld id="{7053BEFA-1175-F644-B249-7D41D72BD3FF}" type="datetime1">
               <a:rPr lang="en-US" smtClean="0"/>
-              <a:t>2/8/17</a:t>
+              <a:t>2/16/17</a:t>
             </a:fld>
             <a:endParaRPr lang="en-US"/>
           </a:p>
@@ -9649,7 +9649,7 @@
           <a:p>
             <a:fld id="{7053BEFA-1175-F644-B249-7D41D72BD3FF}" type="datetime1">
               <a:rPr lang="en-US" smtClean="0"/>
-              <a:t>2/8/17</a:t>
+              <a:t>2/16/17</a:t>
             </a:fld>
             <a:endParaRPr lang="en-US"/>
           </a:p>
@@ -9801,7 +9801,7 @@
           <a:p>
             <a:fld id="{7053BEFA-1175-F644-B249-7D41D72BD3FF}" type="datetime1">
               <a:rPr lang="en-US" smtClean="0"/>
-              <a:t>2/8/17</a:t>
+              <a:t>2/16/17</a:t>
             </a:fld>
             <a:endParaRPr lang="en-US"/>
           </a:p>
@@ -9945,7 +9945,7 @@
           <a:p>
             <a:fld id="{7053BEFA-1175-F644-B249-7D41D72BD3FF}" type="datetime1">
               <a:rPr lang="en-US" smtClean="0"/>
-              <a:t>2/8/17</a:t>
+              <a:t>2/16/17</a:t>
             </a:fld>
             <a:endParaRPr lang="en-US"/>
           </a:p>
@@ -10094,7 +10094,7 @@
           <a:p>
             <a:fld id="{7053BEFA-1175-F644-B249-7D41D72BD3FF}" type="datetime1">
               <a:rPr lang="en-US" smtClean="0"/>
-              <a:t>2/8/17</a:t>
+              <a:t>2/16/17</a:t>
             </a:fld>
             <a:endParaRPr lang="en-US"/>
           </a:p>
@@ -10238,7 +10238,7 @@
           <a:p>
             <a:fld id="{7053BEFA-1175-F644-B249-7D41D72BD3FF}" type="datetime1">
               <a:rPr lang="en-US" smtClean="0"/>
-              <a:t>2/8/17</a:t>
+              <a:t>2/16/17</a:t>
             </a:fld>
             <a:endParaRPr lang="en-US"/>
           </a:p>
@@ -10382,7 +10382,7 @@
           <a:p>
             <a:fld id="{7053BEFA-1175-F644-B249-7D41D72BD3FF}" type="datetime1">
               <a:rPr lang="en-US" smtClean="0"/>
-              <a:t>2/8/17</a:t>
+              <a:t>2/16/17</a:t>
             </a:fld>
             <a:endParaRPr lang="en-US"/>
           </a:p>
@@ -10584,7 +10584,7 @@
           <a:p>
             <a:fld id="{7053BEFA-1175-F644-B249-7D41D72BD3FF}" type="datetime1">
               <a:rPr lang="en-US" smtClean="0"/>
-              <a:t>2/8/17</a:t>
+              <a:t>2/16/17</a:t>
             </a:fld>
             <a:endParaRPr lang="en-US" dirty="0"/>
           </a:p>
@@ -10702,7 +10702,12 @@
             <p:ph idx="1"/>
           </p:nvPr>
         </p:nvSpPr>
-        <p:spPr/>
+        <p:spPr>
+          <a:xfrm>
+            <a:off x="1128943" y="1847153"/>
+            <a:ext cx="7048804" cy="4379976"/>
+          </a:xfrm>
+        </p:spPr>
         <p:txBody>
           <a:bodyPr/>
           <a:lstStyle/>
@@ -10869,7 +10874,7 @@
           <a:p>
             <a:fld id="{7053BEFA-1175-F644-B249-7D41D72BD3FF}" type="datetime1">
               <a:rPr lang="en-US" smtClean="0"/>
-              <a:t>2/8/17</a:t>
+              <a:t>2/16/17</a:t>
             </a:fld>
             <a:endParaRPr lang="en-US"/>
           </a:p>
@@ -11026,7 +11031,7 @@
           <a:p>
             <a:fld id="{7053BEFA-1175-F644-B249-7D41D72BD3FF}" type="datetime1">
               <a:rPr lang="en-US" smtClean="0"/>
-              <a:t>2/8/17</a:t>
+              <a:t>2/16/17</a:t>
             </a:fld>
             <a:endParaRPr lang="en-US"/>
           </a:p>
@@ -11165,15 +11170,7 @@
             </a:r>
             <a:r>
               <a:rPr lang="en-US" dirty="0" smtClean="0"/>
-              <a:t>]-</a:t>
-            </a:r>
-            <a:r>
-              <a:rPr lang="en-US" dirty="0" smtClean="0"/>
-              <a:t>byte3 </a:t>
-            </a:r>
-            <a:r>
-              <a:rPr lang="en-US" dirty="0" smtClean="0"/>
-              <a:t>browser window</a:t>
+              <a:t>]-byte3 browser window</a:t>
             </a:r>
             <a:endParaRPr lang="en-US" dirty="0"/>
           </a:p>
@@ -11196,7 +11193,7 @@
           <a:p>
             <a:fld id="{7053BEFA-1175-F644-B249-7D41D72BD3FF}" type="datetime1">
               <a:rPr lang="en-US" smtClean="0"/>
-              <a:t>2/8/17</a:t>
+              <a:t>2/16/17</a:t>
             </a:fld>
             <a:endParaRPr lang="en-US"/>
           </a:p>
@@ -11321,11 +11318,7 @@
           <a:p>
             <a:r>
               <a:rPr lang="en-US" dirty="0" smtClean="0"/>
-              <a:t>Cleaning: can you tell when the phone is off</a:t>
-            </a:r>
-            <a:r>
-              <a:rPr lang="en-US" dirty="0" smtClean="0"/>
-              <a:t>?</a:t>
+              <a:t>Cleaning: can you tell when the phone is off?</a:t>
             </a:r>
           </a:p>
           <a:p>
@@ -11333,7 +11326,6 @@
               <a:rPr lang="en-US" dirty="0" smtClean="0"/>
               <a:t>Imputing: filling in missing location readings.</a:t>
             </a:r>
-            <a:endParaRPr lang="en-US" dirty="0" smtClean="0"/>
           </a:p>
           <a:p>
             <a:r>
@@ -11369,7 +11361,7 @@
           <a:p>
             <a:fld id="{7053BEFA-1175-F644-B249-7D41D72BD3FF}" type="datetime1">
               <a:rPr lang="en-US" smtClean="0"/>
-              <a:t>2/8/17</a:t>
+              <a:t>2/16/17</a:t>
             </a:fld>
             <a:endParaRPr lang="en-US"/>
           </a:p>
@@ -11511,19 +11503,11 @@
             </a:r>
             <a:r>
               <a:rPr lang="en-US" dirty="0" smtClean="0"/>
-              <a:t>the results (more nicely than </a:t>
-            </a:r>
-            <a:r>
-              <a:rPr lang="en-US" dirty="0" smtClean="0"/>
-              <a:t>we </a:t>
+              <a:t>the results (more nicely than we </a:t>
             </a:r>
             <a:r>
               <a:rPr lang="en-US" smtClean="0"/>
-              <a:t>do</a:t>
-            </a:r>
-            <a:r>
-              <a:rPr lang="en-US" smtClean="0"/>
-              <a:t>!)</a:t>
+              <a:t>do!)</a:t>
             </a:r>
           </a:p>
         </p:txBody>
@@ -11545,7 +11529,7 @@
           <a:p>
             <a:fld id="{7053BEFA-1175-F644-B249-7D41D72BD3FF}" type="datetime1">
               <a:rPr lang="en-US" smtClean="0"/>
-              <a:t>2/8/17</a:t>
+              <a:t>2/16/17</a:t>
             </a:fld>
             <a:endParaRPr lang="en-US"/>
           </a:p>
@@ -11676,11 +11660,7 @@
           <a:p>
             <a:r>
               <a:rPr lang="en-US" dirty="0" smtClean="0"/>
-              <a:t>Talk </a:t>
-            </a:r>
-            <a:r>
-              <a:rPr lang="en-US" dirty="0" smtClean="0"/>
-              <a:t>to me about goals &amp; outcomes that make sense</a:t>
+              <a:t>Talk to me about goals &amp; outcomes that make sense</a:t>
             </a:r>
             <a:endParaRPr lang="en-US" dirty="0"/>
           </a:p>
@@ -11703,7 +11683,7 @@
           <a:p>
             <a:fld id="{7053BEFA-1175-F644-B249-7D41D72BD3FF}" type="datetime1">
               <a:rPr lang="en-US" smtClean="0"/>
-              <a:t>2/9/17</a:t>
+              <a:t>2/16/17</a:t>
             </a:fld>
             <a:endParaRPr lang="en-US"/>
           </a:p>
@@ -11833,7 +11813,7 @@
           <a:p>
             <a:fld id="{7053BEFA-1175-F644-B249-7D41D72BD3FF}" type="datetime1">
               <a:rPr lang="en-US" smtClean="0"/>
-              <a:t>2/8/17</a:t>
+              <a:t>2/16/17</a:t>
             </a:fld>
             <a:endParaRPr lang="en-US"/>
           </a:p>
@@ -12002,7 +11982,7 @@
           <a:lstStyle/>
           <a:p>
             <a:r>
-              <a:rPr lang="en-US"/>
+              <a:rPr lang="en-US" dirty="0"/>
               <a:t>http://</a:t>
             </a:r>
             <a:r>
@@ -12033,7 +12013,7 @@
           <a:p>
             <a:fld id="{7053BEFA-1175-F644-B249-7D41D72BD3FF}" type="datetime1">
               <a:rPr lang="en-US" smtClean="0"/>
-              <a:t>2/8/17</a:t>
+              <a:t>2/16/17</a:t>
             </a:fld>
             <a:endParaRPr lang="en-US"/>
           </a:p>
@@ -12217,7 +12197,7 @@
           <a:p>
             <a:fld id="{7053BEFA-1175-F644-B249-7D41D72BD3FF}" type="datetime1">
               <a:rPr lang="en-US" smtClean="0"/>
-              <a:t>2/8/17</a:t>
+              <a:t>2/16/17</a:t>
             </a:fld>
             <a:endParaRPr lang="en-US" dirty="0"/>
           </a:p>
@@ -12423,7 +12403,7 @@
           <a:p>
             <a:fld id="{7053BEFA-1175-F644-B249-7D41D72BD3FF}" type="datetime1">
               <a:rPr lang="en-US" smtClean="0"/>
-              <a:t>2/8/17</a:t>
+              <a:t>2/16/17</a:t>
             </a:fld>
             <a:endParaRPr lang="en-US"/>
           </a:p>
@@ -12690,7 +12670,7 @@
             <a:fld id="{7053BEFA-1175-F644-B249-7D41D72BD3FF}" type="datetime1">
               <a:rPr lang="en-US"/>
               <a:pPr/>
-              <a:t>2/8/17</a:t>
+              <a:t>2/16/17</a:t>
             </a:fld>
             <a:endParaRPr lang="en-US" dirty="0"/>
           </a:p>
@@ -13119,7 +13099,7 @@
           <a:p>
             <a:fld id="{7053BEFA-1175-F644-B249-7D41D72BD3FF}" type="datetime1">
               <a:rPr lang="en-US" smtClean="0"/>
-              <a:t>2/8/17</a:t>
+              <a:t>2/16/17</a:t>
             </a:fld>
             <a:endParaRPr lang="en-US"/>
           </a:p>
@@ -13447,7 +13427,7 @@
           <a:p>
             <a:fld id="{7053BEFA-1175-F644-B249-7D41D72BD3FF}" type="datetime1">
               <a:rPr lang="en-US" smtClean="0"/>
-              <a:t>2/8/17</a:t>
+              <a:t>2/16/17</a:t>
             </a:fld>
             <a:endParaRPr lang="en-US"/>
           </a:p>

</xml_diff>